<commit_message>
Wrote some example code to compare CPU to GPU
</commit_message>
<xml_diff>
--- a/figures/gpu_intro/GPU_intro_Pix.pptx
+++ b/figures/gpu_intro/GPU_intro_Pix.pptx
@@ -255,7 +255,7 @@
           <a:p>
             <a:fld id="{8749049F-65FB-400B-99EA-5CA2D1D00F38}" type="datetimeFigureOut">
               <a:rPr lang="en-US" smtClean="0"/>
-              <a:t>3/3/2017</a:t>
+              <a:t>3/6/2017</a:t>
             </a:fld>
             <a:endParaRPr lang="en-US"/>
           </a:p>
@@ -425,7 +425,7 @@
           <a:p>
             <a:fld id="{8749049F-65FB-400B-99EA-5CA2D1D00F38}" type="datetimeFigureOut">
               <a:rPr lang="en-US" smtClean="0"/>
-              <a:t>3/3/2017</a:t>
+              <a:t>3/6/2017</a:t>
             </a:fld>
             <a:endParaRPr lang="en-US"/>
           </a:p>
@@ -605,7 +605,7 @@
           <a:p>
             <a:fld id="{8749049F-65FB-400B-99EA-5CA2D1D00F38}" type="datetimeFigureOut">
               <a:rPr lang="en-US" smtClean="0"/>
-              <a:t>3/3/2017</a:t>
+              <a:t>3/6/2017</a:t>
             </a:fld>
             <a:endParaRPr lang="en-US"/>
           </a:p>
@@ -775,7 +775,7 @@
           <a:p>
             <a:fld id="{8749049F-65FB-400B-99EA-5CA2D1D00F38}" type="datetimeFigureOut">
               <a:rPr lang="en-US" smtClean="0"/>
-              <a:t>3/3/2017</a:t>
+              <a:t>3/6/2017</a:t>
             </a:fld>
             <a:endParaRPr lang="en-US"/>
           </a:p>
@@ -1021,7 +1021,7 @@
           <a:p>
             <a:fld id="{8749049F-65FB-400B-99EA-5CA2D1D00F38}" type="datetimeFigureOut">
               <a:rPr lang="en-US" smtClean="0"/>
-              <a:t>3/3/2017</a:t>
+              <a:t>3/6/2017</a:t>
             </a:fld>
             <a:endParaRPr lang="en-US"/>
           </a:p>
@@ -1253,7 +1253,7 @@
           <a:p>
             <a:fld id="{8749049F-65FB-400B-99EA-5CA2D1D00F38}" type="datetimeFigureOut">
               <a:rPr lang="en-US" smtClean="0"/>
-              <a:t>3/3/2017</a:t>
+              <a:t>3/6/2017</a:t>
             </a:fld>
             <a:endParaRPr lang="en-US"/>
           </a:p>
@@ -1620,7 +1620,7 @@
           <a:p>
             <a:fld id="{8749049F-65FB-400B-99EA-5CA2D1D00F38}" type="datetimeFigureOut">
               <a:rPr lang="en-US" smtClean="0"/>
-              <a:t>3/3/2017</a:t>
+              <a:t>3/6/2017</a:t>
             </a:fld>
             <a:endParaRPr lang="en-US"/>
           </a:p>
@@ -1738,7 +1738,7 @@
           <a:p>
             <a:fld id="{8749049F-65FB-400B-99EA-5CA2D1D00F38}" type="datetimeFigureOut">
               <a:rPr lang="en-US" smtClean="0"/>
-              <a:t>3/3/2017</a:t>
+              <a:t>3/6/2017</a:t>
             </a:fld>
             <a:endParaRPr lang="en-US"/>
           </a:p>
@@ -1833,7 +1833,7 @@
           <a:p>
             <a:fld id="{8749049F-65FB-400B-99EA-5CA2D1D00F38}" type="datetimeFigureOut">
               <a:rPr lang="en-US" smtClean="0"/>
-              <a:t>3/3/2017</a:t>
+              <a:t>3/6/2017</a:t>
             </a:fld>
             <a:endParaRPr lang="en-US"/>
           </a:p>
@@ -2110,7 +2110,7 @@
           <a:p>
             <a:fld id="{8749049F-65FB-400B-99EA-5CA2D1D00F38}" type="datetimeFigureOut">
               <a:rPr lang="en-US" smtClean="0"/>
-              <a:t>3/3/2017</a:t>
+              <a:t>3/6/2017</a:t>
             </a:fld>
             <a:endParaRPr lang="en-US"/>
           </a:p>
@@ -2363,7 +2363,7 @@
           <a:p>
             <a:fld id="{8749049F-65FB-400B-99EA-5CA2D1D00F38}" type="datetimeFigureOut">
               <a:rPr lang="en-US" smtClean="0"/>
-              <a:t>3/3/2017</a:t>
+              <a:t>3/6/2017</a:t>
             </a:fld>
             <a:endParaRPr lang="en-US"/>
           </a:p>
@@ -2576,7 +2576,7 @@
           <a:p>
             <a:fld id="{8749049F-65FB-400B-99EA-5CA2D1D00F38}" type="datetimeFigureOut">
               <a:rPr lang="en-US" smtClean="0"/>
-              <a:t>3/3/2017</a:t>
+              <a:t>3/6/2017</a:t>
             </a:fld>
             <a:endParaRPr lang="en-US"/>
           </a:p>

</xml_diff>

<commit_message>
starting to rework the GPU intro section
</commit_message>
<xml_diff>
--- a/figures/gpu_intro/GPU_intro_Pix.pptx
+++ b/figures/gpu_intro/GPU_intro_Pix.pptx
@@ -260,7 +260,7 @@
           <a:p>
             <a:fld id="{8749049F-65FB-400B-99EA-5CA2D1D00F38}" type="datetimeFigureOut">
               <a:rPr lang="en-US" smtClean="0"/>
-              <a:t>3/11/2017</a:t>
+              <a:t>3/13/2017</a:t>
             </a:fld>
             <a:endParaRPr lang="en-US"/>
           </a:p>
@@ -430,7 +430,7 @@
           <a:p>
             <a:fld id="{8749049F-65FB-400B-99EA-5CA2D1D00F38}" type="datetimeFigureOut">
               <a:rPr lang="en-US" smtClean="0"/>
-              <a:t>3/11/2017</a:t>
+              <a:t>3/13/2017</a:t>
             </a:fld>
             <a:endParaRPr lang="en-US"/>
           </a:p>
@@ -610,7 +610,7 @@
           <a:p>
             <a:fld id="{8749049F-65FB-400B-99EA-5CA2D1D00F38}" type="datetimeFigureOut">
               <a:rPr lang="en-US" smtClean="0"/>
-              <a:t>3/11/2017</a:t>
+              <a:t>3/13/2017</a:t>
             </a:fld>
             <a:endParaRPr lang="en-US"/>
           </a:p>
@@ -780,7 +780,7 @@
           <a:p>
             <a:fld id="{8749049F-65FB-400B-99EA-5CA2D1D00F38}" type="datetimeFigureOut">
               <a:rPr lang="en-US" smtClean="0"/>
-              <a:t>3/11/2017</a:t>
+              <a:t>3/13/2017</a:t>
             </a:fld>
             <a:endParaRPr lang="en-US"/>
           </a:p>
@@ -1026,7 +1026,7 @@
           <a:p>
             <a:fld id="{8749049F-65FB-400B-99EA-5CA2D1D00F38}" type="datetimeFigureOut">
               <a:rPr lang="en-US" smtClean="0"/>
-              <a:t>3/11/2017</a:t>
+              <a:t>3/13/2017</a:t>
             </a:fld>
             <a:endParaRPr lang="en-US"/>
           </a:p>
@@ -1258,7 +1258,7 @@
           <a:p>
             <a:fld id="{8749049F-65FB-400B-99EA-5CA2D1D00F38}" type="datetimeFigureOut">
               <a:rPr lang="en-US" smtClean="0"/>
-              <a:t>3/11/2017</a:t>
+              <a:t>3/13/2017</a:t>
             </a:fld>
             <a:endParaRPr lang="en-US"/>
           </a:p>
@@ -1625,7 +1625,7 @@
           <a:p>
             <a:fld id="{8749049F-65FB-400B-99EA-5CA2D1D00F38}" type="datetimeFigureOut">
               <a:rPr lang="en-US" smtClean="0"/>
-              <a:t>3/11/2017</a:t>
+              <a:t>3/13/2017</a:t>
             </a:fld>
             <a:endParaRPr lang="en-US"/>
           </a:p>
@@ -1743,7 +1743,7 @@
           <a:p>
             <a:fld id="{8749049F-65FB-400B-99EA-5CA2D1D00F38}" type="datetimeFigureOut">
               <a:rPr lang="en-US" smtClean="0"/>
-              <a:t>3/11/2017</a:t>
+              <a:t>3/13/2017</a:t>
             </a:fld>
             <a:endParaRPr lang="en-US"/>
           </a:p>
@@ -1838,7 +1838,7 @@
           <a:p>
             <a:fld id="{8749049F-65FB-400B-99EA-5CA2D1D00F38}" type="datetimeFigureOut">
               <a:rPr lang="en-US" smtClean="0"/>
-              <a:t>3/11/2017</a:t>
+              <a:t>3/13/2017</a:t>
             </a:fld>
             <a:endParaRPr lang="en-US"/>
           </a:p>
@@ -2115,7 +2115,7 @@
           <a:p>
             <a:fld id="{8749049F-65FB-400B-99EA-5CA2D1D00F38}" type="datetimeFigureOut">
               <a:rPr lang="en-US" smtClean="0"/>
-              <a:t>3/11/2017</a:t>
+              <a:t>3/13/2017</a:t>
             </a:fld>
             <a:endParaRPr lang="en-US"/>
           </a:p>
@@ -2368,7 +2368,7 @@
           <a:p>
             <a:fld id="{8749049F-65FB-400B-99EA-5CA2D1D00F38}" type="datetimeFigureOut">
               <a:rPr lang="en-US" smtClean="0"/>
-              <a:t>3/11/2017</a:t>
+              <a:t>3/13/2017</a:t>
             </a:fld>
             <a:endParaRPr lang="en-US"/>
           </a:p>
@@ -2581,7 +2581,7 @@
           <a:p>
             <a:fld id="{8749049F-65FB-400B-99EA-5CA2D1D00F38}" type="datetimeFigureOut">
               <a:rPr lang="en-US" smtClean="0"/>
-              <a:t>3/11/2017</a:t>
+              <a:t>3/13/2017</a:t>
             </a:fld>
             <a:endParaRPr lang="en-US"/>
           </a:p>
@@ -27447,6 +27447,13 @@
   <p:clrMapOvr>
     <a:masterClrMapping/>
   </p:clrMapOvr>
+  <p:timing>
+    <p:tnLst>
+      <p:par>
+        <p:cTn id="1" dur="indefinite" restart="never" nodeType="tmRoot"/>
+      </p:par>
+    </p:tnLst>
+  </p:timing>
 </p:sld>
 </file>
 
@@ -35454,25 +35461,7 @@
                     <a:latin typeface="Times New Roman" panose="02020603050405020304" pitchFamily="18" charset="0"/>
                     <a:cs typeface="Times New Roman" panose="02020603050405020304" pitchFamily="18" charset="0"/>
                   </a:rPr>
-                  <a:t>Thread </a:t>
-                </a:r>
-                <a:r>
-                  <a:rPr lang="en-US" dirty="0" smtClean="0">
-                    <a:ln w="0"/>
-                    <a:solidFill>
-                      <a:schemeClr val="tx1"/>
-                    </a:solidFill>
-                    <a:effectLst>
-                      <a:outerShdw blurRad="38100" dist="19050" dir="2700000" algn="tl" rotWithShape="0">
-                        <a:schemeClr val="dk1">
-                          <a:alpha val="40000"/>
-                        </a:schemeClr>
-                      </a:outerShdw>
-                    </a:effectLst>
-                    <a:latin typeface="Times New Roman" panose="02020603050405020304" pitchFamily="18" charset="0"/>
-                    <a:cs typeface="Times New Roman" panose="02020603050405020304" pitchFamily="18" charset="0"/>
-                  </a:rPr>
-                  <a:t>0</a:t>
+                  <a:t>Thread 0</a:t>
                 </a:r>
               </a:p>
             </p:txBody>

</xml_diff>

<commit_message>
Finished writing the GPU convolution section....it is pretty good, it will be useful to refure to
</commit_message>
<xml_diff>
--- a/figures/gpu_intro/GPU_intro_Pix.pptx
+++ b/figures/gpu_intro/GPU_intro_Pix.pptx
@@ -10,8 +10,9 @@
     <p:sldId id="258" r:id="rId4"/>
     <p:sldId id="259" r:id="rId5"/>
     <p:sldId id="260" r:id="rId6"/>
-    <p:sldId id="261" r:id="rId7"/>
-    <p:sldId id="262" r:id="rId8"/>
+    <p:sldId id="263" r:id="rId7"/>
+    <p:sldId id="261" r:id="rId8"/>
+    <p:sldId id="262" r:id="rId9"/>
   </p:sldIdLst>
   <p:sldSz cx="12192000" cy="6858000"/>
   <p:notesSz cx="6881813" cy="9296400"/>
@@ -260,7 +261,7 @@
           <a:p>
             <a:fld id="{8749049F-65FB-400B-99EA-5CA2D1D00F38}" type="datetimeFigureOut">
               <a:rPr lang="en-US" smtClean="0"/>
-              <a:t>3/13/2017</a:t>
+              <a:t>3/18/2017</a:t>
             </a:fld>
             <a:endParaRPr lang="en-US"/>
           </a:p>
@@ -430,7 +431,7 @@
           <a:p>
             <a:fld id="{8749049F-65FB-400B-99EA-5CA2D1D00F38}" type="datetimeFigureOut">
               <a:rPr lang="en-US" smtClean="0"/>
-              <a:t>3/13/2017</a:t>
+              <a:t>3/18/2017</a:t>
             </a:fld>
             <a:endParaRPr lang="en-US"/>
           </a:p>
@@ -610,7 +611,7 @@
           <a:p>
             <a:fld id="{8749049F-65FB-400B-99EA-5CA2D1D00F38}" type="datetimeFigureOut">
               <a:rPr lang="en-US" smtClean="0"/>
-              <a:t>3/13/2017</a:t>
+              <a:t>3/18/2017</a:t>
             </a:fld>
             <a:endParaRPr lang="en-US"/>
           </a:p>
@@ -780,7 +781,7 @@
           <a:p>
             <a:fld id="{8749049F-65FB-400B-99EA-5CA2D1D00F38}" type="datetimeFigureOut">
               <a:rPr lang="en-US" smtClean="0"/>
-              <a:t>3/13/2017</a:t>
+              <a:t>3/18/2017</a:t>
             </a:fld>
             <a:endParaRPr lang="en-US"/>
           </a:p>
@@ -1026,7 +1027,7 @@
           <a:p>
             <a:fld id="{8749049F-65FB-400B-99EA-5CA2D1D00F38}" type="datetimeFigureOut">
               <a:rPr lang="en-US" smtClean="0"/>
-              <a:t>3/13/2017</a:t>
+              <a:t>3/18/2017</a:t>
             </a:fld>
             <a:endParaRPr lang="en-US"/>
           </a:p>
@@ -1258,7 +1259,7 @@
           <a:p>
             <a:fld id="{8749049F-65FB-400B-99EA-5CA2D1D00F38}" type="datetimeFigureOut">
               <a:rPr lang="en-US" smtClean="0"/>
-              <a:t>3/13/2017</a:t>
+              <a:t>3/18/2017</a:t>
             </a:fld>
             <a:endParaRPr lang="en-US"/>
           </a:p>
@@ -1625,7 +1626,7 @@
           <a:p>
             <a:fld id="{8749049F-65FB-400B-99EA-5CA2D1D00F38}" type="datetimeFigureOut">
               <a:rPr lang="en-US" smtClean="0"/>
-              <a:t>3/13/2017</a:t>
+              <a:t>3/18/2017</a:t>
             </a:fld>
             <a:endParaRPr lang="en-US"/>
           </a:p>
@@ -1743,7 +1744,7 @@
           <a:p>
             <a:fld id="{8749049F-65FB-400B-99EA-5CA2D1D00F38}" type="datetimeFigureOut">
               <a:rPr lang="en-US" smtClean="0"/>
-              <a:t>3/13/2017</a:t>
+              <a:t>3/18/2017</a:t>
             </a:fld>
             <a:endParaRPr lang="en-US"/>
           </a:p>
@@ -1838,7 +1839,7 @@
           <a:p>
             <a:fld id="{8749049F-65FB-400B-99EA-5CA2D1D00F38}" type="datetimeFigureOut">
               <a:rPr lang="en-US" smtClean="0"/>
-              <a:t>3/13/2017</a:t>
+              <a:t>3/18/2017</a:t>
             </a:fld>
             <a:endParaRPr lang="en-US"/>
           </a:p>
@@ -2115,7 +2116,7 @@
           <a:p>
             <a:fld id="{8749049F-65FB-400B-99EA-5CA2D1D00F38}" type="datetimeFigureOut">
               <a:rPr lang="en-US" smtClean="0"/>
-              <a:t>3/13/2017</a:t>
+              <a:t>3/18/2017</a:t>
             </a:fld>
             <a:endParaRPr lang="en-US"/>
           </a:p>
@@ -2368,7 +2369,7 @@
           <a:p>
             <a:fld id="{8749049F-65FB-400B-99EA-5CA2D1D00F38}" type="datetimeFigureOut">
               <a:rPr lang="en-US" smtClean="0"/>
-              <a:t>3/13/2017</a:t>
+              <a:t>3/18/2017</a:t>
             </a:fld>
             <a:endParaRPr lang="en-US"/>
           </a:p>
@@ -2581,7 +2582,7 @@
           <a:p>
             <a:fld id="{8749049F-65FB-400B-99EA-5CA2D1D00F38}" type="datetimeFigureOut">
               <a:rPr lang="en-US" smtClean="0"/>
-              <a:t>3/13/2017</a:t>
+              <a:t>3/18/2017</a:t>
             </a:fld>
             <a:endParaRPr lang="en-US"/>
           </a:p>
@@ -35734,6 +35735,1135 @@
       </p:grpSpPr>
       <p:grpSp>
         <p:nvGrpSpPr>
+          <p:cNvPr id="63" name="Group 62"/>
+          <p:cNvGrpSpPr/>
+          <p:nvPr/>
+        </p:nvGrpSpPr>
+        <p:grpSpPr>
+          <a:xfrm>
+            <a:off x="3488575" y="952500"/>
+            <a:ext cx="4577862" cy="3086100"/>
+            <a:chOff x="3488575" y="952500"/>
+            <a:chExt cx="4577862" cy="3086100"/>
+          </a:xfrm>
+        </p:grpSpPr>
+        <p:grpSp>
+          <p:nvGrpSpPr>
+            <p:cNvPr id="62" name="Group 61"/>
+            <p:cNvGrpSpPr/>
+            <p:nvPr/>
+          </p:nvGrpSpPr>
+          <p:grpSpPr>
+            <a:xfrm>
+              <a:off x="3505200" y="952500"/>
+              <a:ext cx="4561237" cy="1457775"/>
+              <a:chOff x="3505200" y="752025"/>
+              <a:chExt cx="4561237" cy="1457775"/>
+            </a:xfrm>
+          </p:grpSpPr>
+          <p:sp>
+            <p:nvSpPr>
+              <p:cNvPr id="6" name="Rectangle 5"/>
+              <p:cNvSpPr/>
+              <p:nvPr/>
+            </p:nvSpPr>
+            <p:spPr>
+              <a:xfrm>
+                <a:off x="4398590" y="752025"/>
+                <a:ext cx="1143000" cy="1143000"/>
+              </a:xfrm>
+              <a:prstGeom prst="rect">
+                <a:avLst/>
+              </a:prstGeom>
+              <a:solidFill>
+                <a:schemeClr val="bg1">
+                  <a:lumMod val="95000"/>
+                </a:schemeClr>
+              </a:solidFill>
+              <a:ln w="12700">
+                <a:solidFill>
+                  <a:schemeClr val="tx1"/>
+                </a:solidFill>
+              </a:ln>
+            </p:spPr>
+            <p:style>
+              <a:lnRef idx="2">
+                <a:schemeClr val="accent1">
+                  <a:shade val="50000"/>
+                </a:schemeClr>
+              </a:lnRef>
+              <a:fillRef idx="1">
+                <a:schemeClr val="accent1"/>
+              </a:fillRef>
+              <a:effectRef idx="0">
+                <a:schemeClr val="accent1"/>
+              </a:effectRef>
+              <a:fontRef idx="minor">
+                <a:schemeClr val="lt1"/>
+              </a:fontRef>
+            </p:style>
+            <p:txBody>
+              <a:bodyPr rtlCol="0" anchor="ctr"/>
+              <a:lstStyle/>
+              <a:p>
+                <a:pPr algn="ctr"/>
+                <a:r>
+                  <a:rPr lang="en-US" dirty="0" smtClean="0">
+                    <a:ln w="0"/>
+                    <a:solidFill>
+                      <a:schemeClr val="tx1"/>
+                    </a:solidFill>
+                    <a:effectLst>
+                      <a:outerShdw blurRad="38100" dist="19050" dir="2700000" algn="tl" rotWithShape="0">
+                        <a:schemeClr val="dk1">
+                          <a:alpha val="40000"/>
+                        </a:schemeClr>
+                      </a:outerShdw>
+                    </a:effectLst>
+                    <a:latin typeface="Times New Roman" panose="02020603050405020304" pitchFamily="18" charset="0"/>
+                    <a:cs typeface="Times New Roman" panose="02020603050405020304" pitchFamily="18" charset="0"/>
+                  </a:rPr>
+                  <a:t>12672+</a:t>
+                </a:r>
+              </a:p>
+              <a:p>
+                <a:pPr algn="ctr"/>
+                <a:r>
+                  <a:rPr lang="en-US" dirty="0" smtClean="0">
+                    <a:ln w="0"/>
+                    <a:solidFill>
+                      <a:schemeClr val="tx1"/>
+                    </a:solidFill>
+                    <a:effectLst>
+                      <a:outerShdw blurRad="38100" dist="19050" dir="2700000" algn="tl" rotWithShape="0">
+                        <a:schemeClr val="dk1">
+                          <a:alpha val="40000"/>
+                        </a:schemeClr>
+                      </a:outerShdw>
+                    </a:effectLst>
+                    <a:latin typeface="Times New Roman" panose="02020603050405020304" pitchFamily="18" charset="0"/>
+                    <a:cs typeface="Times New Roman" panose="02020603050405020304" pitchFamily="18" charset="0"/>
+                  </a:rPr>
+                  <a:t>186-1</a:t>
+                </a:r>
+                <a:endParaRPr lang="en-US" dirty="0" smtClean="0">
+                  <a:ln w="0"/>
+                  <a:solidFill>
+                    <a:schemeClr val="tx1"/>
+                  </a:solidFill>
+                  <a:effectLst>
+                    <a:outerShdw blurRad="38100" dist="19050" dir="2700000" algn="tl" rotWithShape="0">
+                      <a:schemeClr val="dk1">
+                        <a:alpha val="40000"/>
+                      </a:schemeClr>
+                    </a:outerShdw>
+                  </a:effectLst>
+                  <a:latin typeface="Times New Roman" panose="02020603050405020304" pitchFamily="18" charset="0"/>
+                  <a:cs typeface="Times New Roman" panose="02020603050405020304" pitchFamily="18" charset="0"/>
+                </a:endParaRPr>
+              </a:p>
+              <a:p>
+                <a:pPr algn="ctr"/>
+                <a:r>
+                  <a:rPr lang="en-US" dirty="0" err="1" smtClean="0">
+                    <a:ln w="0"/>
+                    <a:solidFill>
+                      <a:schemeClr val="tx1"/>
+                    </a:solidFill>
+                    <a:effectLst>
+                      <a:outerShdw blurRad="38100" dist="19050" dir="2700000" algn="tl" rotWithShape="0">
+                        <a:schemeClr val="dk1">
+                          <a:alpha val="40000"/>
+                        </a:schemeClr>
+                      </a:outerShdw>
+                    </a:effectLst>
+                    <a:latin typeface="Times New Roman" panose="02020603050405020304" pitchFamily="18" charset="0"/>
+                    <a:cs typeface="Times New Roman" panose="02020603050405020304" pitchFamily="18" charset="0"/>
+                  </a:rPr>
+                  <a:t>Conv</a:t>
+                </a:r>
+                <a:endParaRPr lang="en-US" dirty="0">
+                  <a:latin typeface="Times New Roman" panose="02020603050405020304" pitchFamily="18" charset="0"/>
+                  <a:cs typeface="Times New Roman" panose="02020603050405020304" pitchFamily="18" charset="0"/>
+                </a:endParaRPr>
+              </a:p>
+            </p:txBody>
+          </p:sp>
+          <p:sp>
+            <p:nvSpPr>
+              <p:cNvPr id="8" name="Rectangle 7"/>
+              <p:cNvSpPr/>
+              <p:nvPr/>
+            </p:nvSpPr>
+            <p:spPr>
+              <a:xfrm>
+                <a:off x="6248400" y="752025"/>
+                <a:ext cx="1143000" cy="1143000"/>
+              </a:xfrm>
+              <a:prstGeom prst="rect">
+                <a:avLst/>
+              </a:prstGeom>
+              <a:solidFill>
+                <a:schemeClr val="bg1">
+                  <a:lumMod val="95000"/>
+                </a:schemeClr>
+              </a:solidFill>
+              <a:ln w="12700">
+                <a:solidFill>
+                  <a:schemeClr val="tx1"/>
+                </a:solidFill>
+              </a:ln>
+            </p:spPr>
+            <p:style>
+              <a:lnRef idx="2">
+                <a:schemeClr val="accent1">
+                  <a:shade val="50000"/>
+                </a:schemeClr>
+              </a:lnRef>
+              <a:fillRef idx="1">
+                <a:schemeClr val="accent1"/>
+              </a:fillRef>
+              <a:effectRef idx="0">
+                <a:schemeClr val="accent1"/>
+              </a:effectRef>
+              <a:fontRef idx="minor">
+                <a:schemeClr val="lt1"/>
+              </a:fontRef>
+            </p:style>
+            <p:txBody>
+              <a:bodyPr rtlCol="0" anchor="ctr"/>
+              <a:lstStyle/>
+              <a:p>
+                <a:pPr algn="ctr"/>
+                <a:r>
+                  <a:rPr lang="en-US" dirty="0" smtClean="0">
+                    <a:ln w="0"/>
+                    <a:solidFill>
+                      <a:schemeClr val="tx1"/>
+                    </a:solidFill>
+                    <a:effectLst>
+                      <a:outerShdw blurRad="38100" dist="19050" dir="2700000" algn="tl" rotWithShape="0">
+                        <a:schemeClr val="dk1">
+                          <a:alpha val="40000"/>
+                        </a:schemeClr>
+                      </a:outerShdw>
+                    </a:effectLst>
+                    <a:latin typeface="Times New Roman" panose="02020603050405020304" pitchFamily="18" charset="0"/>
+                    <a:cs typeface="Times New Roman" panose="02020603050405020304" pitchFamily="18" charset="0"/>
+                  </a:rPr>
+                  <a:t>12672+</a:t>
+                </a:r>
+              </a:p>
+              <a:p>
+                <a:pPr algn="ctr"/>
+                <a:r>
+                  <a:rPr lang="en-US" dirty="0" smtClean="0">
+                    <a:ln w="0"/>
+                    <a:solidFill>
+                      <a:schemeClr val="tx1"/>
+                    </a:solidFill>
+                    <a:effectLst>
+                      <a:outerShdw blurRad="38100" dist="19050" dir="2700000" algn="tl" rotWithShape="0">
+                        <a:schemeClr val="dk1">
+                          <a:alpha val="40000"/>
+                        </a:schemeClr>
+                      </a:outerShdw>
+                    </a:effectLst>
+                    <a:latin typeface="Times New Roman" panose="02020603050405020304" pitchFamily="18" charset="0"/>
+                    <a:cs typeface="Times New Roman" panose="02020603050405020304" pitchFamily="18" charset="0"/>
+                  </a:rPr>
+                  <a:t>186+21-2</a:t>
+                </a:r>
+                <a:endParaRPr lang="en-US" dirty="0" smtClean="0">
+                  <a:ln w="0"/>
+                  <a:solidFill>
+                    <a:schemeClr val="tx1"/>
+                  </a:solidFill>
+                  <a:effectLst>
+                    <a:outerShdw blurRad="38100" dist="19050" dir="2700000" algn="tl" rotWithShape="0">
+                      <a:schemeClr val="dk1">
+                        <a:alpha val="40000"/>
+                      </a:schemeClr>
+                    </a:outerShdw>
+                  </a:effectLst>
+                  <a:latin typeface="Times New Roman" panose="02020603050405020304" pitchFamily="18" charset="0"/>
+                  <a:cs typeface="Times New Roman" panose="02020603050405020304" pitchFamily="18" charset="0"/>
+                </a:endParaRPr>
+              </a:p>
+              <a:p>
+                <a:pPr algn="ctr"/>
+                <a:r>
+                  <a:rPr lang="en-US" dirty="0" err="1" smtClean="0">
+                    <a:ln w="0"/>
+                    <a:solidFill>
+                      <a:schemeClr val="tx1"/>
+                    </a:solidFill>
+                    <a:effectLst>
+                      <a:outerShdw blurRad="38100" dist="19050" dir="2700000" algn="tl" rotWithShape="0">
+                        <a:schemeClr val="dk1">
+                          <a:alpha val="40000"/>
+                        </a:schemeClr>
+                      </a:outerShdw>
+                    </a:effectLst>
+                    <a:latin typeface="Times New Roman" panose="02020603050405020304" pitchFamily="18" charset="0"/>
+                    <a:cs typeface="Times New Roman" panose="02020603050405020304" pitchFamily="18" charset="0"/>
+                  </a:rPr>
+                  <a:t>Conv</a:t>
+                </a:r>
+                <a:endParaRPr lang="en-US" dirty="0">
+                  <a:latin typeface="Times New Roman" panose="02020603050405020304" pitchFamily="18" charset="0"/>
+                  <a:cs typeface="Times New Roman" panose="02020603050405020304" pitchFamily="18" charset="0"/>
+                </a:endParaRPr>
+              </a:p>
+            </p:txBody>
+          </p:sp>
+          <p:cxnSp>
+            <p:nvCxnSpPr>
+              <p:cNvPr id="10" name="Straight Arrow Connector 9"/>
+              <p:cNvCxnSpPr/>
+              <p:nvPr/>
+            </p:nvCxnSpPr>
+            <p:spPr>
+              <a:xfrm flipV="1">
+                <a:off x="5551997" y="1093479"/>
+                <a:ext cx="691662" cy="2"/>
+              </a:xfrm>
+              <a:prstGeom prst="straightConnector1">
+                <a:avLst/>
+              </a:prstGeom>
+              <a:ln w="12700">
+                <a:solidFill>
+                  <a:schemeClr val="tx1"/>
+                </a:solidFill>
+                <a:tailEnd type="triangle"/>
+              </a:ln>
+            </p:spPr>
+            <p:style>
+              <a:lnRef idx="1">
+                <a:schemeClr val="accent1"/>
+              </a:lnRef>
+              <a:fillRef idx="0">
+                <a:schemeClr val="accent1"/>
+              </a:fillRef>
+              <a:effectRef idx="0">
+                <a:schemeClr val="accent1"/>
+              </a:effectRef>
+              <a:fontRef idx="minor">
+                <a:schemeClr val="tx1"/>
+              </a:fontRef>
+            </p:style>
+          </p:cxnSp>
+          <p:cxnSp>
+            <p:nvCxnSpPr>
+              <p:cNvPr id="11" name="Straight Arrow Connector 10"/>
+              <p:cNvCxnSpPr/>
+              <p:nvPr/>
+            </p:nvCxnSpPr>
+            <p:spPr>
+              <a:xfrm flipV="1">
+                <a:off x="7374775" y="1323524"/>
+                <a:ext cx="691662" cy="2"/>
+              </a:xfrm>
+              <a:prstGeom prst="straightConnector1">
+                <a:avLst/>
+              </a:prstGeom>
+              <a:ln w="12700">
+                <a:solidFill>
+                  <a:schemeClr val="tx1"/>
+                </a:solidFill>
+                <a:tailEnd type="triangle"/>
+              </a:ln>
+            </p:spPr>
+            <p:style>
+              <a:lnRef idx="1">
+                <a:schemeClr val="accent1"/>
+              </a:lnRef>
+              <a:fillRef idx="0">
+                <a:schemeClr val="accent1"/>
+              </a:fillRef>
+              <a:effectRef idx="0">
+                <a:schemeClr val="accent1"/>
+              </a:effectRef>
+              <a:fontRef idx="minor">
+                <a:schemeClr val="tx1"/>
+              </a:fontRef>
+            </p:style>
+          </p:cxnSp>
+          <p:pic>
+            <p:nvPicPr>
+              <p:cNvPr id="23" name="Picture 22"/>
+              <p:cNvPicPr>
+                <a:picLocks noChangeAspect="1"/>
+              </p:cNvPicPr>
+              <p:nvPr>
+                <p:custDataLst>
+                  <p:tags r:id="rId4"/>
+                </p:custDataLst>
+              </p:nvPr>
+            </p:nvPicPr>
+            <p:blipFill>
+              <a:blip r:embed="rId8" cstate="print">
+                <a:extLst>
+                  <a:ext uri="{28A0092B-C50C-407E-A947-70E740481C1C}">
+                    <a14:useLocalDpi xmlns:a14="http://schemas.microsoft.com/office/drawing/2010/main" val="0"/>
+                  </a:ext>
+                </a:extLst>
+              </a:blip>
+              <a:stretch>
+                <a:fillRect/>
+              </a:stretch>
+            </p:blipFill>
+            <p:spPr>
+              <a:xfrm>
+                <a:off x="3543300" y="1034979"/>
+                <a:ext cx="103619" cy="114286"/>
+              </a:xfrm>
+              <a:prstGeom prst="rect">
+                <a:avLst/>
+              </a:prstGeom>
+              <a:ln w="12700">
+                <a:noFill/>
+              </a:ln>
+            </p:spPr>
+          </p:pic>
+          <p:pic>
+            <p:nvPicPr>
+              <p:cNvPr id="24" name="Picture 23"/>
+              <p:cNvPicPr>
+                <a:picLocks noChangeAspect="1"/>
+              </p:cNvPicPr>
+              <p:nvPr>
+                <p:custDataLst>
+                  <p:tags r:id="rId5"/>
+                </p:custDataLst>
+              </p:nvPr>
+            </p:nvPicPr>
+            <p:blipFill>
+              <a:blip r:embed="rId9" cstate="print">
+                <a:extLst>
+                  <a:ext uri="{28A0092B-C50C-407E-A947-70E740481C1C}">
+                    <a14:useLocalDpi xmlns:a14="http://schemas.microsoft.com/office/drawing/2010/main" val="0"/>
+                  </a:ext>
+                </a:extLst>
+              </a:blip>
+              <a:stretch>
+                <a:fillRect/>
+              </a:stretch>
+            </p:blipFill>
+            <p:spPr>
+              <a:xfrm>
+                <a:off x="3505200" y="1492776"/>
+                <a:ext cx="112762" cy="115810"/>
+              </a:xfrm>
+              <a:prstGeom prst="rect">
+                <a:avLst/>
+              </a:prstGeom>
+              <a:ln w="12700">
+                <a:noFill/>
+              </a:ln>
+            </p:spPr>
+          </p:pic>
+          <p:cxnSp>
+            <p:nvCxnSpPr>
+              <p:cNvPr id="28" name="Straight Arrow Connector 27"/>
+              <p:cNvCxnSpPr/>
+              <p:nvPr/>
+            </p:nvCxnSpPr>
+            <p:spPr>
+              <a:xfrm flipV="1">
+                <a:off x="3708478" y="1550681"/>
+                <a:ext cx="691662" cy="2"/>
+              </a:xfrm>
+              <a:prstGeom prst="straightConnector1">
+                <a:avLst/>
+              </a:prstGeom>
+              <a:ln w="12700">
+                <a:solidFill>
+                  <a:schemeClr val="tx1"/>
+                </a:solidFill>
+                <a:tailEnd type="triangle"/>
+              </a:ln>
+            </p:spPr>
+            <p:style>
+              <a:lnRef idx="1">
+                <a:schemeClr val="accent1"/>
+              </a:lnRef>
+              <a:fillRef idx="0">
+                <a:schemeClr val="accent1"/>
+              </a:fillRef>
+              <a:effectRef idx="0">
+                <a:schemeClr val="accent1"/>
+              </a:effectRef>
+              <a:fontRef idx="minor">
+                <a:schemeClr val="tx1"/>
+              </a:fontRef>
+            </p:style>
+          </p:cxnSp>
+          <p:cxnSp>
+            <p:nvCxnSpPr>
+              <p:cNvPr id="29" name="Straight Arrow Connector 28"/>
+              <p:cNvCxnSpPr/>
+              <p:nvPr/>
+            </p:nvCxnSpPr>
+            <p:spPr>
+              <a:xfrm flipV="1">
+                <a:off x="3699817" y="1092122"/>
+                <a:ext cx="691662" cy="2"/>
+              </a:xfrm>
+              <a:prstGeom prst="straightConnector1">
+                <a:avLst/>
+              </a:prstGeom>
+              <a:ln w="12700">
+                <a:solidFill>
+                  <a:schemeClr val="tx1"/>
+                </a:solidFill>
+                <a:tailEnd type="triangle"/>
+              </a:ln>
+            </p:spPr>
+            <p:style>
+              <a:lnRef idx="1">
+                <a:schemeClr val="accent1"/>
+              </a:lnRef>
+              <a:fillRef idx="0">
+                <a:schemeClr val="accent1"/>
+              </a:fillRef>
+              <a:effectRef idx="0">
+                <a:schemeClr val="accent1"/>
+              </a:effectRef>
+              <a:fontRef idx="minor">
+                <a:schemeClr val="tx1"/>
+              </a:fontRef>
+            </p:style>
+          </p:cxnSp>
+          <p:cxnSp>
+            <p:nvCxnSpPr>
+              <p:cNvPr id="38" name="Elbow Connector 37"/>
+              <p:cNvCxnSpPr/>
+              <p:nvPr/>
+            </p:nvCxnSpPr>
+            <p:spPr>
+              <a:xfrm flipV="1">
+                <a:off x="5551997" y="1550681"/>
+                <a:ext cx="696403" cy="571500"/>
+              </a:xfrm>
+              <a:prstGeom prst="bentConnector3">
+                <a:avLst>
+                  <a:gd name="adj1" fmla="val 50000"/>
+                </a:avLst>
+              </a:prstGeom>
+              <a:ln w="12700">
+                <a:solidFill>
+                  <a:schemeClr val="tx1"/>
+                </a:solidFill>
+                <a:tailEnd type="triangle"/>
+              </a:ln>
+            </p:spPr>
+            <p:style>
+              <a:lnRef idx="1">
+                <a:schemeClr val="accent1"/>
+              </a:lnRef>
+              <a:fillRef idx="0">
+                <a:schemeClr val="accent1"/>
+              </a:fillRef>
+              <a:effectRef idx="0">
+                <a:schemeClr val="accent1"/>
+              </a:effectRef>
+              <a:fontRef idx="minor">
+                <a:schemeClr val="tx1"/>
+              </a:fontRef>
+            </p:style>
+          </p:cxnSp>
+          <p:pic>
+            <p:nvPicPr>
+              <p:cNvPr id="43" name="Picture 42"/>
+              <p:cNvPicPr>
+                <a:picLocks noChangeAspect="1"/>
+              </p:cNvPicPr>
+              <p:nvPr>
+                <p:custDataLst>
+                  <p:tags r:id="rId6"/>
+                </p:custDataLst>
+              </p:nvPr>
+            </p:nvPicPr>
+            <p:blipFill>
+              <a:blip r:embed="rId10" cstate="print">
+                <a:extLst>
+                  <a:ext uri="{28A0092B-C50C-407E-A947-70E740481C1C}">
+                    <a14:useLocalDpi xmlns:a14="http://schemas.microsoft.com/office/drawing/2010/main" val="0"/>
+                  </a:ext>
+                </a:extLst>
+              </a:blip>
+              <a:stretch>
+                <a:fillRect/>
+              </a:stretch>
+            </p:blipFill>
+            <p:spPr>
+              <a:xfrm>
+                <a:off x="5343162" y="2034561"/>
+                <a:ext cx="143238" cy="175239"/>
+              </a:xfrm>
+              <a:prstGeom prst="rect">
+                <a:avLst/>
+              </a:prstGeom>
+              <a:ln w="12700">
+                <a:noFill/>
+              </a:ln>
+            </p:spPr>
+          </p:pic>
+        </p:grpSp>
+        <p:grpSp>
+          <p:nvGrpSpPr>
+            <p:cNvPr id="61" name="Group 60"/>
+            <p:cNvGrpSpPr/>
+            <p:nvPr/>
+          </p:nvGrpSpPr>
+          <p:grpSpPr>
+            <a:xfrm>
+              <a:off x="3488575" y="2611301"/>
+              <a:ext cx="4561237" cy="1427299"/>
+              <a:chOff x="3488575" y="2755992"/>
+              <a:chExt cx="4561237" cy="1427299"/>
+            </a:xfrm>
+          </p:grpSpPr>
+          <p:sp>
+            <p:nvSpPr>
+              <p:cNvPr id="44" name="Rectangle 43"/>
+              <p:cNvSpPr/>
+              <p:nvPr/>
+            </p:nvSpPr>
+            <p:spPr>
+              <a:xfrm>
+                <a:off x="4381965" y="2755992"/>
+                <a:ext cx="1143000" cy="1143000"/>
+              </a:xfrm>
+              <a:prstGeom prst="rect">
+                <a:avLst/>
+              </a:prstGeom>
+              <a:solidFill>
+                <a:schemeClr val="bg1">
+                  <a:lumMod val="95000"/>
+                </a:schemeClr>
+              </a:solidFill>
+              <a:ln w="12700">
+                <a:solidFill>
+                  <a:schemeClr val="tx1"/>
+                </a:solidFill>
+              </a:ln>
+            </p:spPr>
+            <p:style>
+              <a:lnRef idx="2">
+                <a:schemeClr val="accent1">
+                  <a:shade val="50000"/>
+                </a:schemeClr>
+              </a:lnRef>
+              <a:fillRef idx="1">
+                <a:schemeClr val="accent1"/>
+              </a:fillRef>
+              <a:effectRef idx="0">
+                <a:schemeClr val="accent1"/>
+              </a:effectRef>
+              <a:fontRef idx="minor">
+                <a:schemeClr val="lt1"/>
+              </a:fontRef>
+            </p:style>
+            <p:txBody>
+              <a:bodyPr rtlCol="0" anchor="ctr"/>
+              <a:lstStyle/>
+              <a:p>
+                <a:pPr algn="ctr"/>
+                <a:r>
+                  <a:rPr lang="en-US" dirty="0" smtClean="0">
+                    <a:ln w="0"/>
+                    <a:solidFill>
+                      <a:schemeClr val="tx1"/>
+                    </a:solidFill>
+                    <a:effectLst>
+                      <a:outerShdw blurRad="38100" dist="19050" dir="2700000" algn="tl" rotWithShape="0">
+                        <a:schemeClr val="dk1">
+                          <a:alpha val="40000"/>
+                        </a:schemeClr>
+                      </a:outerShdw>
+                    </a:effectLst>
+                    <a:latin typeface="Times New Roman" panose="02020603050405020304" pitchFamily="18" charset="0"/>
+                    <a:cs typeface="Times New Roman" panose="02020603050405020304" pitchFamily="18" charset="0"/>
+                  </a:rPr>
+                  <a:t>186+21-1</a:t>
+                </a:r>
+              </a:p>
+              <a:p>
+                <a:pPr algn="ctr"/>
+                <a:r>
+                  <a:rPr lang="en-US" dirty="0" err="1" smtClean="0">
+                    <a:ln w="0"/>
+                    <a:solidFill>
+                      <a:schemeClr val="tx1"/>
+                    </a:solidFill>
+                    <a:effectLst>
+                      <a:outerShdw blurRad="38100" dist="19050" dir="2700000" algn="tl" rotWithShape="0">
+                        <a:schemeClr val="dk1">
+                          <a:alpha val="40000"/>
+                        </a:schemeClr>
+                      </a:outerShdw>
+                    </a:effectLst>
+                    <a:latin typeface="Times New Roman" panose="02020603050405020304" pitchFamily="18" charset="0"/>
+                    <a:cs typeface="Times New Roman" panose="02020603050405020304" pitchFamily="18" charset="0"/>
+                  </a:rPr>
+                  <a:t>Conv</a:t>
+                </a:r>
+                <a:endParaRPr lang="en-US" dirty="0">
+                  <a:latin typeface="Times New Roman" panose="02020603050405020304" pitchFamily="18" charset="0"/>
+                  <a:cs typeface="Times New Roman" panose="02020603050405020304" pitchFamily="18" charset="0"/>
+                </a:endParaRPr>
+              </a:p>
+            </p:txBody>
+          </p:sp>
+          <p:sp>
+            <p:nvSpPr>
+              <p:cNvPr id="45" name="Rectangle 44"/>
+              <p:cNvSpPr/>
+              <p:nvPr/>
+            </p:nvSpPr>
+            <p:spPr>
+              <a:xfrm>
+                <a:off x="6231775" y="2755992"/>
+                <a:ext cx="1143000" cy="1143000"/>
+              </a:xfrm>
+              <a:prstGeom prst="rect">
+                <a:avLst/>
+              </a:prstGeom>
+              <a:solidFill>
+                <a:schemeClr val="bg1">
+                  <a:lumMod val="95000"/>
+                </a:schemeClr>
+              </a:solidFill>
+              <a:ln w="12700">
+                <a:solidFill>
+                  <a:schemeClr val="tx1"/>
+                </a:solidFill>
+              </a:ln>
+            </p:spPr>
+            <p:style>
+              <a:lnRef idx="2">
+                <a:schemeClr val="accent1">
+                  <a:shade val="50000"/>
+                </a:schemeClr>
+              </a:lnRef>
+              <a:fillRef idx="1">
+                <a:schemeClr val="accent1"/>
+              </a:fillRef>
+              <a:effectRef idx="0">
+                <a:schemeClr val="accent1"/>
+              </a:effectRef>
+              <a:fontRef idx="minor">
+                <a:schemeClr val="lt1"/>
+              </a:fontRef>
+            </p:style>
+            <p:txBody>
+              <a:bodyPr rtlCol="0" anchor="ctr"/>
+              <a:lstStyle/>
+              <a:p>
+                <a:pPr algn="ctr"/>
+                <a:r>
+                  <a:rPr lang="en-US" dirty="0">
+                    <a:ln w="0"/>
+                    <a:solidFill>
+                      <a:schemeClr val="tx1"/>
+                    </a:solidFill>
+                    <a:effectLst>
+                      <a:outerShdw blurRad="38100" dist="19050" dir="2700000" algn="tl" rotWithShape="0">
+                        <a:schemeClr val="dk1">
+                          <a:alpha val="40000"/>
+                        </a:schemeClr>
+                      </a:outerShdw>
+                    </a:effectLst>
+                    <a:latin typeface="Times New Roman" panose="02020603050405020304" pitchFamily="18" charset="0"/>
+                    <a:cs typeface="Times New Roman" panose="02020603050405020304" pitchFamily="18" charset="0"/>
+                  </a:rPr>
+                  <a:t>12672+</a:t>
+                </a:r>
+              </a:p>
+              <a:p>
+                <a:pPr algn="ctr"/>
+                <a:r>
+                  <a:rPr lang="en-US" dirty="0">
+                    <a:ln w="0"/>
+                    <a:solidFill>
+                      <a:schemeClr val="tx1"/>
+                    </a:solidFill>
+                    <a:effectLst>
+                      <a:outerShdw blurRad="38100" dist="19050" dir="2700000" algn="tl" rotWithShape="0">
+                        <a:schemeClr val="dk1">
+                          <a:alpha val="40000"/>
+                        </a:schemeClr>
+                      </a:outerShdw>
+                    </a:effectLst>
+                    <a:latin typeface="Times New Roman" panose="02020603050405020304" pitchFamily="18" charset="0"/>
+                    <a:cs typeface="Times New Roman" panose="02020603050405020304" pitchFamily="18" charset="0"/>
+                  </a:rPr>
+                  <a:t>186+21-2</a:t>
+                </a:r>
+              </a:p>
+              <a:p>
+                <a:pPr algn="ctr"/>
+                <a:r>
+                  <a:rPr lang="en-US" dirty="0" err="1">
+                    <a:ln w="0"/>
+                    <a:solidFill>
+                      <a:schemeClr val="tx1"/>
+                    </a:solidFill>
+                    <a:effectLst>
+                      <a:outerShdw blurRad="38100" dist="19050" dir="2700000" algn="tl" rotWithShape="0">
+                        <a:schemeClr val="dk1">
+                          <a:alpha val="40000"/>
+                        </a:schemeClr>
+                      </a:outerShdw>
+                    </a:effectLst>
+                    <a:latin typeface="Times New Roman" panose="02020603050405020304" pitchFamily="18" charset="0"/>
+                    <a:cs typeface="Times New Roman" panose="02020603050405020304" pitchFamily="18" charset="0"/>
+                  </a:rPr>
+                  <a:t>Conv</a:t>
+                </a:r>
+                <a:endParaRPr lang="en-US" dirty="0">
+                  <a:latin typeface="Times New Roman" panose="02020603050405020304" pitchFamily="18" charset="0"/>
+                  <a:cs typeface="Times New Roman" panose="02020603050405020304" pitchFamily="18" charset="0"/>
+                </a:endParaRPr>
+              </a:p>
+            </p:txBody>
+          </p:sp>
+          <p:cxnSp>
+            <p:nvCxnSpPr>
+              <p:cNvPr id="46" name="Straight Arrow Connector 45"/>
+              <p:cNvCxnSpPr/>
+              <p:nvPr/>
+            </p:nvCxnSpPr>
+            <p:spPr>
+              <a:xfrm flipV="1">
+                <a:off x="5535372" y="3097446"/>
+                <a:ext cx="691662" cy="2"/>
+              </a:xfrm>
+              <a:prstGeom prst="straightConnector1">
+                <a:avLst/>
+              </a:prstGeom>
+              <a:ln w="12700">
+                <a:solidFill>
+                  <a:schemeClr val="tx1"/>
+                </a:solidFill>
+                <a:tailEnd type="triangle"/>
+              </a:ln>
+            </p:spPr>
+            <p:style>
+              <a:lnRef idx="1">
+                <a:schemeClr val="accent1"/>
+              </a:lnRef>
+              <a:fillRef idx="0">
+                <a:schemeClr val="accent1"/>
+              </a:fillRef>
+              <a:effectRef idx="0">
+                <a:schemeClr val="accent1"/>
+              </a:effectRef>
+              <a:fontRef idx="minor">
+                <a:schemeClr val="tx1"/>
+              </a:fontRef>
+            </p:style>
+          </p:cxnSp>
+          <p:cxnSp>
+            <p:nvCxnSpPr>
+              <p:cNvPr id="47" name="Straight Arrow Connector 46"/>
+              <p:cNvCxnSpPr/>
+              <p:nvPr/>
+            </p:nvCxnSpPr>
+            <p:spPr>
+              <a:xfrm flipV="1">
+                <a:off x="7358150" y="3327491"/>
+                <a:ext cx="691662" cy="2"/>
+              </a:xfrm>
+              <a:prstGeom prst="straightConnector1">
+                <a:avLst/>
+              </a:prstGeom>
+              <a:ln w="12700">
+                <a:solidFill>
+                  <a:schemeClr val="tx1"/>
+                </a:solidFill>
+                <a:tailEnd type="triangle"/>
+              </a:ln>
+            </p:spPr>
+            <p:style>
+              <a:lnRef idx="1">
+                <a:schemeClr val="accent1"/>
+              </a:lnRef>
+              <a:fillRef idx="0">
+                <a:schemeClr val="accent1"/>
+              </a:fillRef>
+              <a:effectRef idx="0">
+                <a:schemeClr val="accent1"/>
+              </a:effectRef>
+              <a:fontRef idx="minor">
+                <a:schemeClr val="tx1"/>
+              </a:fontRef>
+            </p:style>
+          </p:cxnSp>
+          <p:pic>
+            <p:nvPicPr>
+              <p:cNvPr id="59" name="Picture 58"/>
+              <p:cNvPicPr>
+                <a:picLocks noChangeAspect="1"/>
+              </p:cNvPicPr>
+              <p:nvPr>
+                <p:custDataLst>
+                  <p:tags r:id="rId1"/>
+                </p:custDataLst>
+              </p:nvPr>
+            </p:nvPicPr>
+            <p:blipFill>
+              <a:blip r:embed="rId10" cstate="print">
+                <a:extLst>
+                  <a:ext uri="{28A0092B-C50C-407E-A947-70E740481C1C}">
+                    <a14:useLocalDpi xmlns:a14="http://schemas.microsoft.com/office/drawing/2010/main" val="0"/>
+                  </a:ext>
+                </a:extLst>
+              </a:blip>
+              <a:stretch>
+                <a:fillRect/>
+              </a:stretch>
+            </p:blipFill>
+            <p:spPr>
+              <a:xfrm>
+                <a:off x="3529718" y="3008470"/>
+                <a:ext cx="143238" cy="175238"/>
+              </a:xfrm>
+              <a:prstGeom prst="rect">
+                <a:avLst/>
+              </a:prstGeom>
+              <a:ln w="12700">
+                <a:noFill/>
+              </a:ln>
+            </p:spPr>
+          </p:pic>
+          <p:pic>
+            <p:nvPicPr>
+              <p:cNvPr id="51" name="Picture 50"/>
+              <p:cNvPicPr>
+                <a:picLocks noChangeAspect="1"/>
+              </p:cNvPicPr>
+              <p:nvPr>
+                <p:custDataLst>
+                  <p:tags r:id="rId2"/>
+                </p:custDataLst>
+              </p:nvPr>
+            </p:nvPicPr>
+            <p:blipFill>
+              <a:blip r:embed="rId9" cstate="print">
+                <a:extLst>
+                  <a:ext uri="{28A0092B-C50C-407E-A947-70E740481C1C}">
+                    <a14:useLocalDpi xmlns:a14="http://schemas.microsoft.com/office/drawing/2010/main" val="0"/>
+                  </a:ext>
+                </a:extLst>
+              </a:blip>
+              <a:stretch>
+                <a:fillRect/>
+              </a:stretch>
+            </p:blipFill>
+            <p:spPr>
+              <a:xfrm>
+                <a:off x="3488575" y="3496743"/>
+                <a:ext cx="112762" cy="115810"/>
+              </a:xfrm>
+              <a:prstGeom prst="rect">
+                <a:avLst/>
+              </a:prstGeom>
+              <a:ln w="12700">
+                <a:noFill/>
+              </a:ln>
+            </p:spPr>
+          </p:pic>
+          <p:cxnSp>
+            <p:nvCxnSpPr>
+              <p:cNvPr id="52" name="Straight Arrow Connector 51"/>
+              <p:cNvCxnSpPr/>
+              <p:nvPr/>
+            </p:nvCxnSpPr>
+            <p:spPr>
+              <a:xfrm flipV="1">
+                <a:off x="3691853" y="3554648"/>
+                <a:ext cx="691662" cy="2"/>
+              </a:xfrm>
+              <a:prstGeom prst="straightConnector1">
+                <a:avLst/>
+              </a:prstGeom>
+              <a:ln w="12700">
+                <a:solidFill>
+                  <a:schemeClr val="tx1"/>
+                </a:solidFill>
+                <a:tailEnd type="triangle"/>
+              </a:ln>
+            </p:spPr>
+            <p:style>
+              <a:lnRef idx="1">
+                <a:schemeClr val="accent1"/>
+              </a:lnRef>
+              <a:fillRef idx="0">
+                <a:schemeClr val="accent1"/>
+              </a:fillRef>
+              <a:effectRef idx="0">
+                <a:schemeClr val="accent1"/>
+              </a:effectRef>
+              <a:fontRef idx="minor">
+                <a:schemeClr val="tx1"/>
+              </a:fontRef>
+            </p:style>
+          </p:cxnSp>
+          <p:cxnSp>
+            <p:nvCxnSpPr>
+              <p:cNvPr id="53" name="Straight Arrow Connector 52"/>
+              <p:cNvCxnSpPr/>
+              <p:nvPr/>
+            </p:nvCxnSpPr>
+            <p:spPr>
+              <a:xfrm flipV="1">
+                <a:off x="3683192" y="3096089"/>
+                <a:ext cx="691662" cy="2"/>
+              </a:xfrm>
+              <a:prstGeom prst="straightConnector1">
+                <a:avLst/>
+              </a:prstGeom>
+              <a:ln w="12700">
+                <a:solidFill>
+                  <a:schemeClr val="tx1"/>
+                </a:solidFill>
+                <a:tailEnd type="triangle"/>
+              </a:ln>
+            </p:spPr>
+            <p:style>
+              <a:lnRef idx="1">
+                <a:schemeClr val="accent1"/>
+              </a:lnRef>
+              <a:fillRef idx="0">
+                <a:schemeClr val="accent1"/>
+              </a:fillRef>
+              <a:effectRef idx="0">
+                <a:schemeClr val="accent1"/>
+              </a:effectRef>
+              <a:fontRef idx="minor">
+                <a:schemeClr val="tx1"/>
+              </a:fontRef>
+            </p:style>
+          </p:cxnSp>
+          <p:cxnSp>
+            <p:nvCxnSpPr>
+              <p:cNvPr id="57" name="Elbow Connector 56"/>
+              <p:cNvCxnSpPr/>
+              <p:nvPr/>
+            </p:nvCxnSpPr>
+            <p:spPr>
+              <a:xfrm flipV="1">
+                <a:off x="5535372" y="3554648"/>
+                <a:ext cx="696403" cy="571500"/>
+              </a:xfrm>
+              <a:prstGeom prst="bentConnector3">
+                <a:avLst>
+                  <a:gd name="adj1" fmla="val 50000"/>
+                </a:avLst>
+              </a:prstGeom>
+              <a:ln w="12700">
+                <a:solidFill>
+                  <a:schemeClr val="tx1"/>
+                </a:solidFill>
+                <a:tailEnd type="triangle"/>
+              </a:ln>
+            </p:spPr>
+            <p:style>
+              <a:lnRef idx="1">
+                <a:schemeClr val="accent1"/>
+              </a:lnRef>
+              <a:fillRef idx="0">
+                <a:schemeClr val="accent1"/>
+              </a:fillRef>
+              <a:effectRef idx="0">
+                <a:schemeClr val="accent1"/>
+              </a:effectRef>
+              <a:fontRef idx="minor">
+                <a:schemeClr val="tx1"/>
+              </a:fontRef>
+            </p:style>
+          </p:cxnSp>
+          <p:pic>
+            <p:nvPicPr>
+              <p:cNvPr id="60" name="Picture 59"/>
+              <p:cNvPicPr>
+                <a:picLocks noChangeAspect="1"/>
+              </p:cNvPicPr>
+              <p:nvPr>
+                <p:custDataLst>
+                  <p:tags r:id="rId3"/>
+                </p:custDataLst>
+              </p:nvPr>
+            </p:nvPicPr>
+            <p:blipFill>
+              <a:blip r:embed="rId8" cstate="print">
+                <a:extLst>
+                  <a:ext uri="{28A0092B-C50C-407E-A947-70E740481C1C}">
+                    <a14:useLocalDpi xmlns:a14="http://schemas.microsoft.com/office/drawing/2010/main" val="0"/>
+                  </a:ext>
+                </a:extLst>
+              </a:blip>
+              <a:stretch>
+                <a:fillRect/>
+              </a:stretch>
+            </p:blipFill>
+            <p:spPr>
+              <a:xfrm>
+                <a:off x="5341143" y="4069005"/>
+                <a:ext cx="103619" cy="114286"/>
+              </a:xfrm>
+              <a:prstGeom prst="rect">
+                <a:avLst/>
+              </a:prstGeom>
+              <a:ln w="12700">
+                <a:noFill/>
+              </a:ln>
+            </p:spPr>
+          </p:pic>
+        </p:grpSp>
+      </p:grpSp>
+    </p:spTree>
+    <p:extLst>
+      <p:ext uri="{BB962C8B-B14F-4D97-AF65-F5344CB8AC3E}">
+        <p14:creationId xmlns:p14="http://schemas.microsoft.com/office/powerpoint/2010/main" val="2825736296"/>
+      </p:ext>
+    </p:extLst>
+  </p:cSld>
+  <p:clrMapOvr>
+    <a:masterClrMapping/>
+  </p:clrMapOvr>
+  <p:timing>
+    <p:tnLst>
+      <p:par>
+        <p:cTn id="1" dur="indefinite" restart="never" nodeType="tmRoot"/>
+      </p:par>
+    </p:tnLst>
+  </p:timing>
+</p:sld>
+</file>
+
+<file path=ppt/slides/slide7.xml><?xml version="1.0" encoding="utf-8"?>
+<p:sld xmlns:a="http://schemas.openxmlformats.org/drawingml/2006/main" xmlns:r="http://schemas.openxmlformats.org/officeDocument/2006/relationships" xmlns:p="http://schemas.openxmlformats.org/presentationml/2006/main">
+  <p:cSld>
+    <p:spTree>
+      <p:nvGrpSpPr>
+        <p:cNvPr id="1" name=""/>
+        <p:cNvGrpSpPr/>
+        <p:nvPr/>
+      </p:nvGrpSpPr>
+      <p:grpSpPr>
+        <a:xfrm>
+          <a:off x="0" y="0"/>
+          <a:ext cx="0" cy="0"/>
+          <a:chOff x="0" y="0"/>
+          <a:chExt cx="0" cy="0"/>
+        </a:xfrm>
+      </p:grpSpPr>
+      <p:grpSp>
+        <p:nvGrpSpPr>
           <p:cNvPr id="52" name="Group 51"/>
           <p:cNvGrpSpPr/>
           <p:nvPr/>
@@ -37523,7 +38653,7 @@
 </p:sld>
 </file>
 
-<file path=ppt/slides/slide7.xml><?xml version="1.0" encoding="utf-8"?>
+<file path=ppt/slides/slide8.xml><?xml version="1.0" encoding="utf-8"?>
 <p:sld xmlns:a="http://schemas.openxmlformats.org/drawingml/2006/main" xmlns:r="http://schemas.openxmlformats.org/officeDocument/2006/relationships" xmlns:p="http://schemas.openxmlformats.org/presentationml/2006/main">
   <p:cSld>
     <p:spTree>
@@ -40605,6 +41735,102 @@
 </p:tagLst>
 </file>
 
+<file path=ppt/tags/tag23.xml><?xml version="1.0" encoding="utf-8"?>
+<p:tagLst xmlns:a="http://schemas.openxmlformats.org/drawingml/2006/main" xmlns:r="http://schemas.openxmlformats.org/officeDocument/2006/relationships" xmlns:p="http://schemas.openxmlformats.org/presentationml/2006/main">
+  <p:tag name="ORIGINALHEIGHT" val="86.23921"/>
+  <p:tag name="ORIGINALWIDTH" val="70.49118"/>
+  <p:tag name="OUTPUTDPI" val="1200"/>
+  <p:tag name="LATEXADDIN" val="\documentclass{article}&#10;\usepackage{amsmath}&#10;\pagestyle{empty}&#10;\begin{document}&#10;&#10;$\mathbf{d}$&#10;&#10;&#10;\end{document}"/>
+  <p:tag name="IGUANATEXSIZE" val="20"/>
+  <p:tag name="IGUANATEXCURSOR" val="91"/>
+  <p:tag name="TRANSPARENCY" val="True"/>
+  <p:tag name="FILENAME" val=""/>
+  <p:tag name="INPUTTYPE" val="0"/>
+  <p:tag name="LATEXENGINEID" val="0"/>
+  <p:tag name="TEMPFOLDER" val="C:\Users\ecestudent\Documents\IguanaTexTemp\"/>
+</p:tagLst>
+</file>
+
+<file path=ppt/tags/tag24.xml><?xml version="1.0" encoding="utf-8"?>
+<p:tagLst xmlns:a="http://schemas.openxmlformats.org/drawingml/2006/main" xmlns:r="http://schemas.openxmlformats.org/officeDocument/2006/relationships" xmlns:p="http://schemas.openxmlformats.org/presentationml/2006/main">
+  <p:tag name="ORIGINALHEIGHT" val="56.99291"/>
+  <p:tag name="ORIGINALWIDTH" val="55.49307"/>
+  <p:tag name="OUTPUTDPI" val="1200"/>
+  <p:tag name="LATEXADDIN" val="\documentclass{article}&#10;\usepackage{amsmath}&#10;\pagestyle{empty}&#10;\begin{document}&#10;&#10;$\mathbf{c}$&#10;&#10;&#10;\end{document}"/>
+  <p:tag name="IGUANATEXSIZE" val="20"/>
+  <p:tag name="IGUANATEXCURSOR" val="91"/>
+  <p:tag name="TRANSPARENCY" val="True"/>
+  <p:tag name="FILENAME" val=""/>
+  <p:tag name="INPUTTYPE" val="0"/>
+  <p:tag name="LATEXENGINEID" val="0"/>
+  <p:tag name="TEMPFOLDER" val="C:\Users\ecestudent\Documents\IguanaTexTemp\"/>
+</p:tagLst>
+</file>
+
+<file path=ppt/tags/tag25.xml><?xml version="1.0" encoding="utf-8"?>
+<p:tagLst xmlns:a="http://schemas.openxmlformats.org/drawingml/2006/main" xmlns:r="http://schemas.openxmlformats.org/officeDocument/2006/relationships" xmlns:p="http://schemas.openxmlformats.org/presentationml/2006/main">
+  <p:tag name="ORIGINALHEIGHT" val="56.24299"/>
+  <p:tag name="ORIGINALWIDTH" val="50.99362"/>
+  <p:tag name="OUTPUTDPI" val="1200"/>
+  <p:tag name="LATEXADDIN" val="\documentclass{article}&#10;\usepackage{amsmath}&#10;\pagestyle{empty}&#10;\begin{document}&#10;&#10;$\mathbf{r}$&#10;&#10;&#10;\end{document}"/>
+  <p:tag name="IGUANATEXSIZE" val="20"/>
+  <p:tag name="IGUANATEXCURSOR" val="91"/>
+  <p:tag name="TRANSPARENCY" val="True"/>
+  <p:tag name="FILENAME" val=""/>
+  <p:tag name="INPUTTYPE" val="0"/>
+  <p:tag name="LATEXENGINEID" val="0"/>
+  <p:tag name="TEMPFOLDER" val="C:\Users\ecestudent\Documents\IguanaTexTemp\"/>
+</p:tagLst>
+</file>
+
+<file path=ppt/tags/tag26.xml><?xml version="1.0" encoding="utf-8"?>
+<p:tagLst xmlns:a="http://schemas.openxmlformats.org/drawingml/2006/main" xmlns:r="http://schemas.openxmlformats.org/officeDocument/2006/relationships" xmlns:p="http://schemas.openxmlformats.org/presentationml/2006/main">
+  <p:tag name="ORIGINALHEIGHT" val="56.24299"/>
+  <p:tag name="ORIGINALWIDTH" val="50.99362"/>
+  <p:tag name="OUTPUTDPI" val="1200"/>
+  <p:tag name="LATEXADDIN" val="\documentclass{article}&#10;\usepackage{amsmath}&#10;\pagestyle{empty}&#10;\begin{document}&#10;&#10;$\mathbf{r}$&#10;&#10;&#10;\end{document}"/>
+  <p:tag name="IGUANATEXSIZE" val="20"/>
+  <p:tag name="IGUANATEXCURSOR" val="92"/>
+  <p:tag name="TRANSPARENCY" val="True"/>
+  <p:tag name="FILENAME" val=""/>
+  <p:tag name="INPUTTYPE" val="0"/>
+  <p:tag name="LATEXENGINEID" val="0"/>
+  <p:tag name="TEMPFOLDER" val="C:\Users\ecestudent\Documents\IguanaTexTemp\"/>
+</p:tagLst>
+</file>
+
+<file path=ppt/tags/tag27.xml><?xml version="1.0" encoding="utf-8"?>
+<p:tagLst xmlns:a="http://schemas.openxmlformats.org/drawingml/2006/main" xmlns:r="http://schemas.openxmlformats.org/officeDocument/2006/relationships" xmlns:p="http://schemas.openxmlformats.org/presentationml/2006/main">
+  <p:tag name="ORIGINALHEIGHT" val="56.99291"/>
+  <p:tag name="ORIGINALWIDTH" val="55.49307"/>
+  <p:tag name="OUTPUTDPI" val="1200"/>
+  <p:tag name="LATEXADDIN" val="\documentclass{article}&#10;\usepackage{amsmath}&#10;\pagestyle{empty}&#10;\begin{document}&#10;&#10;$\mathbf{c}$&#10;&#10;&#10;\end{document}"/>
+  <p:tag name="IGUANATEXSIZE" val="20"/>
+  <p:tag name="IGUANATEXCURSOR" val="91"/>
+  <p:tag name="TRANSPARENCY" val="True"/>
+  <p:tag name="FILENAME" val=""/>
+  <p:tag name="INPUTTYPE" val="0"/>
+  <p:tag name="LATEXENGINEID" val="0"/>
+  <p:tag name="TEMPFOLDER" val="C:\Users\ecestudent\Documents\IguanaTexTemp\"/>
+</p:tagLst>
+</file>
+
+<file path=ppt/tags/tag28.xml><?xml version="1.0" encoding="utf-8"?>
+<p:tagLst xmlns:a="http://schemas.openxmlformats.org/drawingml/2006/main" xmlns:r="http://schemas.openxmlformats.org/officeDocument/2006/relationships" xmlns:p="http://schemas.openxmlformats.org/presentationml/2006/main">
+  <p:tag name="ORIGINALHEIGHT" val="86.23921"/>
+  <p:tag name="ORIGINALWIDTH" val="70.49118"/>
+  <p:tag name="OUTPUTDPI" val="1200"/>
+  <p:tag name="LATEXADDIN" val="\documentclass{article}&#10;\usepackage{amsmath}&#10;\pagestyle{empty}&#10;\begin{document}&#10;&#10;$\mathbf{d}$&#10;&#10;&#10;\end{document}"/>
+  <p:tag name="IGUANATEXSIZE" val="20"/>
+  <p:tag name="IGUANATEXCURSOR" val="91"/>
+  <p:tag name="TRANSPARENCY" val="True"/>
+  <p:tag name="FILENAME" val=""/>
+  <p:tag name="INPUTTYPE" val="0"/>
+  <p:tag name="LATEXENGINEID" val="0"/>
+  <p:tag name="TEMPFOLDER" val="C:\Users\ecestudent\Documents\IguanaTexTemp\"/>
+</p:tagLst>
+</file>
+
 <file path=ppt/tags/tag3.xml><?xml version="1.0" encoding="utf-8"?>
 <p:tagLst xmlns:a="http://schemas.openxmlformats.org/drawingml/2006/main" xmlns:r="http://schemas.openxmlformats.org/officeDocument/2006/relationships" xmlns:p="http://schemas.openxmlformats.org/presentationml/2006/main">
   <p:tag name="ORIGINALHEIGHT" val="119.2351"/>

</xml_diff>